<commit_message>
Update GymNest Výstupní prezentace.pptx
</commit_message>
<xml_diff>
--- a/Výstupy projektu/GymNest Výstupní prezentace.pptx
+++ b/Výstupy projektu/GymNest Výstupní prezentace.pptx
@@ -5,47 +5,48 @@
     <p:sldMasterId id="2147483671" r:id="rId1"/>
   </p:sldMasterIdLst>
   <p:notesMasterIdLst>
-    <p:notesMasterId r:id="rId11"/>
+    <p:notesMasterId r:id="rId12"/>
   </p:notesMasterIdLst>
   <p:sldIdLst>
     <p:sldId id="256" r:id="rId2"/>
     <p:sldId id="261" r:id="rId3"/>
     <p:sldId id="299" r:id="rId4"/>
-    <p:sldId id="298" r:id="rId5"/>
-    <p:sldId id="300" r:id="rId6"/>
-    <p:sldId id="302" r:id="rId7"/>
-    <p:sldId id="303" r:id="rId8"/>
-    <p:sldId id="301" r:id="rId9"/>
-    <p:sldId id="304" r:id="rId10"/>
+    <p:sldId id="305" r:id="rId5"/>
+    <p:sldId id="298" r:id="rId6"/>
+    <p:sldId id="300" r:id="rId7"/>
+    <p:sldId id="302" r:id="rId8"/>
+    <p:sldId id="303" r:id="rId9"/>
+    <p:sldId id="301" r:id="rId10"/>
+    <p:sldId id="304" r:id="rId11"/>
   </p:sldIdLst>
   <p:sldSz cx="9144000" cy="5143500" type="screen16x9"/>
   <p:notesSz cx="6858000" cy="9144000"/>
   <p:embeddedFontLst>
     <p:embeddedFont>
       <p:font typeface="Epilogue" panose="020B0604020202020204" charset="-18"/>
-      <p:regular r:id="rId12"/>
-      <p:bold r:id="rId13"/>
-      <p:italic r:id="rId14"/>
-      <p:boldItalic r:id="rId15"/>
+      <p:regular r:id="rId13"/>
+      <p:bold r:id="rId14"/>
+      <p:italic r:id="rId15"/>
+      <p:boldItalic r:id="rId16"/>
     </p:embeddedFont>
     <p:embeddedFont>
       <p:font typeface="Lato" panose="020F0502020204030203" pitchFamily="34" charset="0"/>
-      <p:regular r:id="rId16"/>
-      <p:bold r:id="rId17"/>
-      <p:italic r:id="rId18"/>
-      <p:boldItalic r:id="rId19"/>
+      <p:regular r:id="rId17"/>
+      <p:bold r:id="rId18"/>
+      <p:italic r:id="rId19"/>
+      <p:boldItalic r:id="rId20"/>
     </p:embeddedFont>
     <p:embeddedFont>
       <p:font typeface="Nunito Light" pitchFamily="2" charset="-18"/>
-      <p:regular r:id="rId20"/>
-      <p:italic r:id="rId21"/>
+      <p:regular r:id="rId21"/>
+      <p:italic r:id="rId22"/>
     </p:embeddedFont>
     <p:embeddedFont>
       <p:font typeface="Raleway" pitchFamily="2" charset="-18"/>
-      <p:regular r:id="rId22"/>
-      <p:bold r:id="rId23"/>
-      <p:italic r:id="rId24"/>
-      <p:boldItalic r:id="rId25"/>
+      <p:regular r:id="rId23"/>
+      <p:bold r:id="rId24"/>
+      <p:italic r:id="rId25"/>
+      <p:boldItalic r:id="rId26"/>
     </p:embeddedFont>
   </p:embeddedFontLst>
   <p:defaultTextStyle>
@@ -277,6 +278,11 @@
       </a:defRPr>
     </a:lvl9pPr>
   </p:defaultTextStyle>
+  <p:extLst>
+    <p:ext uri="{EFAFB233-063F-42B5-8137-9DF3F51BA10A}">
+      <p15:sldGuideLst xmlns:p15="http://schemas.microsoft.com/office/powerpoint/2012/main"/>
+    </p:ext>
+  </p:extLst>
 </p:presentation>
 </file>
 
@@ -955,7 +961,7 @@
           <a:p>
             <a:r>
               <a:rPr lang="cs-CZ" dirty="0"/>
-              <a:t>Jednak jde oblast s málo hráči na trhu, kteří se většinou soustředí na jiné funkce (například virtuální kouč)</a:t>
+              <a:t>Jednak jde oblast s málo hráči na trhu, kteří se většinou soustředí na jiné funkce (například virtuální kouč nebo domácí trenér)</a:t>
             </a:r>
           </a:p>
           <a:p>
@@ -1147,6 +1153,87 @@
               <a:buNone/>
             </a:pPr>
             <a:r>
+              <a:rPr lang="cs-CZ" sz="1000" dirty="0"/>
+              <a:t>Tady je širší výpis technologií, které jsme používali. A není jich zrovna málo.</a:t>
+            </a:r>
+          </a:p>
+          <a:p>
+            <a:pPr marL="158750" indent="0">
+              <a:buNone/>
+            </a:pPr>
+            <a:r>
+              <a:rPr lang="cs-CZ" sz="1000" dirty="0"/>
+              <a:t>Tady ještě zdůrazním, že zabezpečení je realizování pomocí JWT tokenů.</a:t>
+            </a:r>
+          </a:p>
+        </p:txBody>
+      </p:sp>
+    </p:spTree>
+    <p:extLst>
+      <p:ext uri="{BB962C8B-B14F-4D97-AF65-F5344CB8AC3E}">
+        <p14:creationId xmlns:p14="http://schemas.microsoft.com/office/powerpoint/2010/main" val="4166822208"/>
+      </p:ext>
+    </p:extLst>
+  </p:cSld>
+  <p:clrMapOvr>
+    <a:masterClrMapping/>
+  </p:clrMapOvr>
+</p:notes>
+</file>
+
+<file path=ppt/notesSlides/notesSlide5.xml><?xml version="1.0" encoding="utf-8"?>
+<p:notes xmlns:a="http://schemas.openxmlformats.org/drawingml/2006/main" xmlns:r="http://schemas.openxmlformats.org/officeDocument/2006/relationships" xmlns:p="http://schemas.openxmlformats.org/presentationml/2006/main">
+  <p:cSld>
+    <p:spTree>
+      <p:nvGrpSpPr>
+        <p:cNvPr id="1" name=""/>
+        <p:cNvGrpSpPr/>
+        <p:nvPr/>
+      </p:nvGrpSpPr>
+      <p:grpSpPr>
+        <a:xfrm>
+          <a:off x="0" y="0"/>
+          <a:ext cx="0" cy="0"/>
+          <a:chOff x="0" y="0"/>
+          <a:chExt cx="0" cy="0"/>
+        </a:xfrm>
+      </p:grpSpPr>
+      <p:sp>
+        <p:nvSpPr>
+          <p:cNvPr id="2" name="Zástupný symbol pro obrázek snímku 1"/>
+          <p:cNvSpPr>
+            <a:spLocks noGrp="1" noRot="1" noChangeAspect="1"/>
+          </p:cNvSpPr>
+          <p:nvPr>
+            <p:ph type="sldImg"/>
+          </p:nvPr>
+        </p:nvSpPr>
+        <p:spPr>
+          <a:xfrm>
+            <a:off x="381000" y="685800"/>
+            <a:ext cx="6096000" cy="3429000"/>
+          </a:xfrm>
+        </p:spPr>
+      </p:sp>
+      <p:sp>
+        <p:nvSpPr>
+          <p:cNvPr id="3" name="Zástupný symbol pro poznámky 2"/>
+          <p:cNvSpPr>
+            <a:spLocks noGrp="1"/>
+          </p:cNvSpPr>
+          <p:nvPr>
+            <p:ph type="body" idx="1"/>
+          </p:nvPr>
+        </p:nvSpPr>
+        <p:spPr/>
+        <p:txBody>
+          <a:bodyPr/>
+          <a:lstStyle/>
+          <a:p>
+            <a:pPr marL="158750" indent="0">
+              <a:buNone/>
+            </a:pPr>
+            <a:r>
               <a:rPr lang="cs-CZ" dirty="0"/>
               <a:t>Mezi externí služby jsme implementovali přihlášení přes Google.</a:t>
             </a:r>
@@ -1175,7 +1262,7 @@
 </p:notes>
 </file>
 
-<file path=ppt/notesSlides/notesSlide5.xml><?xml version="1.0" encoding="utf-8"?>
+<file path=ppt/notesSlides/notesSlide6.xml><?xml version="1.0" encoding="utf-8"?>
 <p:notes xmlns:a="http://schemas.openxmlformats.org/drawingml/2006/main" xmlns:r="http://schemas.openxmlformats.org/officeDocument/2006/relationships" xmlns:p="http://schemas.openxmlformats.org/presentationml/2006/main">
   <p:cSld>
     <p:spTree>
@@ -1247,7 +1334,7 @@
 </p:notes>
 </file>
 
-<file path=ppt/notesSlides/notesSlide6.xml><?xml version="1.0" encoding="utf-8"?>
+<file path=ppt/notesSlides/notesSlide7.xml><?xml version="1.0" encoding="utf-8"?>
 <p:notes xmlns:a="http://schemas.openxmlformats.org/drawingml/2006/main" xmlns:r="http://schemas.openxmlformats.org/officeDocument/2006/relationships" xmlns:p="http://schemas.openxmlformats.org/presentationml/2006/main">
   <p:cSld>
     <p:spTree>
@@ -1319,7 +1406,7 @@
 </p:notes>
 </file>
 
-<file path=ppt/notesSlides/notesSlide7.xml><?xml version="1.0" encoding="utf-8"?>
+<file path=ppt/notesSlides/notesSlide8.xml><?xml version="1.0" encoding="utf-8"?>
 <p:notes xmlns:a="http://schemas.openxmlformats.org/drawingml/2006/main" xmlns:r="http://schemas.openxmlformats.org/officeDocument/2006/relationships" xmlns:p="http://schemas.openxmlformats.org/presentationml/2006/main">
   <p:cSld>
     <p:spTree>
@@ -1400,7 +1487,7 @@
 </p:notes>
 </file>
 
-<file path=ppt/notesSlides/notesSlide8.xml><?xml version="1.0" encoding="utf-8"?>
+<file path=ppt/notesSlides/notesSlide9.xml><?xml version="1.0" encoding="utf-8"?>
 <p:notes xmlns:a="http://schemas.openxmlformats.org/drawingml/2006/main" xmlns:r="http://schemas.openxmlformats.org/officeDocument/2006/relationships" xmlns:p="http://schemas.openxmlformats.org/presentationml/2006/main">
   <p:cSld>
     <p:spTree>
@@ -26639,6 +26726,129 @@
         </p:sp>
       </p:grpSp>
     </p:spTree>
+  </p:cSld>
+  <p:clrMapOvr>
+    <a:masterClrMapping/>
+  </p:clrMapOvr>
+</p:sld>
+</file>
+
+<file path=ppt/slides/slide10.xml><?xml version="1.0" encoding="utf-8"?>
+<p:sld xmlns:a="http://schemas.openxmlformats.org/drawingml/2006/main" xmlns:r="http://schemas.openxmlformats.org/officeDocument/2006/relationships" xmlns:p="http://schemas.openxmlformats.org/presentationml/2006/main">
+  <p:cSld>
+    <p:spTree>
+      <p:nvGrpSpPr>
+        <p:cNvPr id="1" name=""/>
+        <p:cNvGrpSpPr/>
+        <p:nvPr/>
+      </p:nvGrpSpPr>
+      <p:grpSpPr>
+        <a:xfrm>
+          <a:off x="0" y="0"/>
+          <a:ext cx="0" cy="0"/>
+          <a:chOff x="0" y="0"/>
+          <a:chExt cx="0" cy="0"/>
+        </a:xfrm>
+      </p:grpSpPr>
+      <p:sp>
+        <p:nvSpPr>
+          <p:cNvPr id="2" name="Nadpis 1">
+            <a:extLst>
+              <a:ext uri="{FF2B5EF4-FFF2-40B4-BE49-F238E27FC236}">
+                <a16:creationId xmlns:a16="http://schemas.microsoft.com/office/drawing/2014/main" id="{15E4D1DE-7FF0-27CD-B5A1-F60B5999A251}"/>
+              </a:ext>
+            </a:extLst>
+          </p:cNvPr>
+          <p:cNvSpPr>
+            <a:spLocks noGrp="1"/>
+          </p:cNvSpPr>
+          <p:nvPr>
+            <p:ph type="ctrTitle"/>
+          </p:nvPr>
+        </p:nvSpPr>
+        <p:spPr>
+          <a:xfrm>
+            <a:off x="713225" y="1144500"/>
+            <a:ext cx="5101788" cy="2378700"/>
+          </a:xfrm>
+        </p:spPr>
+        <p:txBody>
+          <a:bodyPr/>
+          <a:lstStyle/>
+          <a:p>
+            <a:r>
+              <a:rPr lang="cs-CZ" dirty="0"/>
+              <a:t>Představení … </a:t>
+            </a:r>
+          </a:p>
+        </p:txBody>
+      </p:sp>
+      <p:sp>
+        <p:nvSpPr>
+          <p:cNvPr id="3" name="Podnadpis 2">
+            <a:extLst>
+              <a:ext uri="{FF2B5EF4-FFF2-40B4-BE49-F238E27FC236}">
+                <a16:creationId xmlns:a16="http://schemas.microsoft.com/office/drawing/2014/main" id="{774284EC-D61D-5A02-14B2-61E87E408680}"/>
+              </a:ext>
+            </a:extLst>
+          </p:cNvPr>
+          <p:cNvSpPr>
+            <a:spLocks noGrp="1"/>
+          </p:cNvSpPr>
+          <p:nvPr>
+            <p:ph type="subTitle" idx="1"/>
+          </p:nvPr>
+        </p:nvSpPr>
+        <p:spPr>
+          <a:xfrm>
+            <a:off x="713224" y="3523200"/>
+            <a:ext cx="5008919" cy="475800"/>
+          </a:xfrm>
+        </p:spPr>
+        <p:txBody>
+          <a:bodyPr/>
+          <a:lstStyle/>
+          <a:p>
+            <a:endParaRPr lang="cs-CZ" dirty="0"/>
+          </a:p>
+        </p:txBody>
+      </p:sp>
+      <p:pic>
+        <p:nvPicPr>
+          <p:cNvPr id="4" name="Obrázek 3" descr="Obsah obrázku černá, tma&#10;&#10;Popis byl vytvořen automaticky">
+            <a:extLst>
+              <a:ext uri="{FF2B5EF4-FFF2-40B4-BE49-F238E27FC236}">
+                <a16:creationId xmlns:a16="http://schemas.microsoft.com/office/drawing/2014/main" id="{503A4904-D0E9-1BDD-DF2C-940EBD17D544}"/>
+              </a:ext>
+            </a:extLst>
+          </p:cNvPr>
+          <p:cNvPicPr>
+            <a:picLocks noChangeAspect="1"/>
+          </p:cNvPicPr>
+          <p:nvPr/>
+        </p:nvPicPr>
+        <p:blipFill>
+          <a:blip r:embed="rId2"/>
+          <a:stretch>
+            <a:fillRect/>
+          </a:stretch>
+        </p:blipFill>
+        <p:spPr>
+          <a:xfrm>
+            <a:off x="6749495" y="3003247"/>
+            <a:ext cx="2321353" cy="2321353"/>
+          </a:xfrm>
+          <a:prstGeom prst="rect">
+            <a:avLst/>
+          </a:prstGeom>
+        </p:spPr>
+      </p:pic>
+    </p:spTree>
+    <p:extLst>
+      <p:ext uri="{BB962C8B-B14F-4D97-AF65-F5344CB8AC3E}">
+        <p14:creationId xmlns:p14="http://schemas.microsoft.com/office/powerpoint/2010/main" val="3263248756"/>
+      </p:ext>
+    </p:extLst>
   </p:cSld>
   <p:clrMapOvr>
     <a:masterClrMapping/>
@@ -33083,6 +33293,735 @@
           <p:cNvPr id="2" name="Nadpis 1">
             <a:extLst>
               <a:ext uri="{FF2B5EF4-FFF2-40B4-BE49-F238E27FC236}">
+                <a16:creationId xmlns:a16="http://schemas.microsoft.com/office/drawing/2014/main" id="{3D3BCC40-0F14-7F36-3718-4EECEF9DF73F}"/>
+              </a:ext>
+            </a:extLst>
+          </p:cNvPr>
+          <p:cNvSpPr>
+            <a:spLocks noGrp="1"/>
+          </p:cNvSpPr>
+          <p:nvPr>
+            <p:ph type="title"/>
+          </p:nvPr>
+        </p:nvSpPr>
+        <p:spPr/>
+        <p:txBody>
+          <a:bodyPr/>
+          <a:lstStyle/>
+          <a:p>
+            <a:r>
+              <a:rPr lang="cs-CZ" dirty="0"/>
+              <a:t>Technologie - konkrétně</a:t>
+            </a:r>
+          </a:p>
+        </p:txBody>
+      </p:sp>
+      <p:sp>
+        <p:nvSpPr>
+          <p:cNvPr id="3" name="Zástupný text 2">
+            <a:extLst>
+              <a:ext uri="{FF2B5EF4-FFF2-40B4-BE49-F238E27FC236}">
+                <a16:creationId xmlns:a16="http://schemas.microsoft.com/office/drawing/2014/main" id="{AB5CD5FE-0366-99D2-1C40-EC4E66D35FCE}"/>
+              </a:ext>
+            </a:extLst>
+          </p:cNvPr>
+          <p:cNvSpPr>
+            <a:spLocks noGrp="1"/>
+          </p:cNvSpPr>
+          <p:nvPr>
+            <p:ph type="body" idx="1"/>
+          </p:nvPr>
+        </p:nvSpPr>
+        <p:spPr>
+          <a:xfrm>
+            <a:off x="5244292" y="1199849"/>
+            <a:ext cx="3287457" cy="3416400"/>
+          </a:xfrm>
+        </p:spPr>
+        <p:txBody>
+          <a:bodyPr/>
+          <a:lstStyle/>
+          <a:p>
+            <a:pPr marL="152400" indent="0" algn="just">
+              <a:lnSpc>
+                <a:spcPct val="107000"/>
+              </a:lnSpc>
+              <a:spcAft>
+                <a:spcPts val="800"/>
+              </a:spcAft>
+              <a:buNone/>
+            </a:pPr>
+            <a:r>
+              <a:rPr lang="cs-CZ" sz="1400" b="1" dirty="0"/>
+              <a:t>Backend</a:t>
+            </a:r>
+          </a:p>
+          <a:p>
+            <a:pPr algn="just">
+              <a:lnSpc>
+                <a:spcPct val="107000"/>
+              </a:lnSpc>
+              <a:spcAft>
+                <a:spcPts val="800"/>
+              </a:spcAft>
+            </a:pPr>
+            <a:r>
+              <a:rPr lang="cs-CZ" sz="1400" dirty="0"/>
+              <a:t>Express.js</a:t>
+            </a:r>
+          </a:p>
+          <a:p>
+            <a:pPr algn="just">
+              <a:lnSpc>
+                <a:spcPct val="107000"/>
+              </a:lnSpc>
+              <a:spcAft>
+                <a:spcPts val="800"/>
+              </a:spcAft>
+            </a:pPr>
+            <a:r>
+              <a:rPr lang="cs-CZ" sz="1400" dirty="0"/>
+              <a:t>MySQL2</a:t>
+            </a:r>
+          </a:p>
+          <a:p>
+            <a:pPr algn="just">
+              <a:lnSpc>
+                <a:spcPct val="107000"/>
+              </a:lnSpc>
+              <a:spcAft>
+                <a:spcPts val="800"/>
+              </a:spcAft>
+            </a:pPr>
+            <a:r>
+              <a:rPr lang="cs-CZ" sz="1400" dirty="0" err="1"/>
+              <a:t>Sequelize</a:t>
+            </a:r>
+            <a:endParaRPr lang="cs-CZ" sz="1400" dirty="0"/>
+          </a:p>
+          <a:p>
+            <a:pPr algn="just">
+              <a:lnSpc>
+                <a:spcPct val="107000"/>
+              </a:lnSpc>
+              <a:spcAft>
+                <a:spcPts val="800"/>
+              </a:spcAft>
+            </a:pPr>
+            <a:r>
+              <a:rPr lang="cs-CZ" sz="1400" dirty="0"/>
+              <a:t>Passport.js</a:t>
+            </a:r>
+          </a:p>
+          <a:p>
+            <a:pPr algn="just">
+              <a:lnSpc>
+                <a:spcPct val="107000"/>
+              </a:lnSpc>
+              <a:spcAft>
+                <a:spcPts val="800"/>
+              </a:spcAft>
+            </a:pPr>
+            <a:r>
+              <a:rPr lang="cs-CZ" sz="1400" b="1" dirty="0"/>
+              <a:t>JWT</a:t>
+            </a:r>
+          </a:p>
+          <a:p>
+            <a:pPr algn="just">
+              <a:lnSpc>
+                <a:spcPct val="107000"/>
+              </a:lnSpc>
+              <a:spcAft>
+                <a:spcPts val="800"/>
+              </a:spcAft>
+            </a:pPr>
+            <a:r>
+              <a:rPr lang="cs-CZ" sz="1400" dirty="0" err="1"/>
+              <a:t>Dotenv</a:t>
+            </a:r>
+            <a:endParaRPr lang="cs-CZ" sz="1400" dirty="0"/>
+          </a:p>
+          <a:p>
+            <a:pPr algn="just">
+              <a:lnSpc>
+                <a:spcPct val="107000"/>
+              </a:lnSpc>
+              <a:spcAft>
+                <a:spcPts val="800"/>
+              </a:spcAft>
+            </a:pPr>
+            <a:r>
+              <a:rPr lang="cs-CZ" sz="1400" dirty="0" err="1"/>
+              <a:t>Pug</a:t>
+            </a:r>
+            <a:endParaRPr lang="cs-CZ" sz="1400" dirty="0"/>
+          </a:p>
+          <a:p>
+            <a:pPr algn="just">
+              <a:lnSpc>
+                <a:spcPct val="107000"/>
+              </a:lnSpc>
+              <a:spcAft>
+                <a:spcPts val="800"/>
+              </a:spcAft>
+            </a:pPr>
+            <a:r>
+              <a:rPr lang="cs-CZ" sz="1400" dirty="0" err="1"/>
+              <a:t>Swagger</a:t>
+            </a:r>
+            <a:endParaRPr lang="cs-CZ" sz="1400" dirty="0"/>
+          </a:p>
+          <a:p>
+            <a:pPr algn="just">
+              <a:lnSpc>
+                <a:spcPct val="107000"/>
+              </a:lnSpc>
+              <a:spcAft>
+                <a:spcPts val="800"/>
+              </a:spcAft>
+            </a:pPr>
+            <a:r>
+              <a:rPr lang="cs-CZ" sz="1400" dirty="0"/>
+              <a:t>Morgan, </a:t>
+            </a:r>
+            <a:r>
+              <a:rPr lang="cs-CZ" sz="1400" dirty="0" err="1"/>
+              <a:t>Debug</a:t>
+            </a:r>
+            <a:r>
+              <a:rPr lang="cs-CZ" sz="1400" dirty="0"/>
+              <a:t>, HTTP-</a:t>
+            </a:r>
+            <a:r>
+              <a:rPr lang="cs-CZ" sz="1400" dirty="0" err="1"/>
+              <a:t>Errors</a:t>
+            </a:r>
+            <a:r>
+              <a:rPr lang="cs-CZ" sz="1400" dirty="0"/>
+              <a:t>: </a:t>
+            </a:r>
+          </a:p>
+        </p:txBody>
+      </p:sp>
+      <p:sp>
+        <p:nvSpPr>
+          <p:cNvPr id="4" name="Zástupný text 2">
+            <a:extLst>
+              <a:ext uri="{FF2B5EF4-FFF2-40B4-BE49-F238E27FC236}">
+                <a16:creationId xmlns:a16="http://schemas.microsoft.com/office/drawing/2014/main" id="{C4613C32-CC42-E31F-2A90-E3A67CA5DCE2}"/>
+              </a:ext>
+            </a:extLst>
+          </p:cNvPr>
+          <p:cNvSpPr txBox="1">
+            <a:spLocks/>
+          </p:cNvSpPr>
+          <p:nvPr/>
+        </p:nvSpPr>
+        <p:spPr>
+          <a:xfrm>
+            <a:off x="943962" y="1199849"/>
+            <a:ext cx="3287457" cy="3416400"/>
+          </a:xfrm>
+          <a:prstGeom prst="rect">
+            <a:avLst/>
+          </a:prstGeom>
+          <a:noFill/>
+          <a:ln>
+            <a:noFill/>
+          </a:ln>
+        </p:spPr>
+        <p:txBody>
+          <a:bodyPr spcFirstLastPara="1" wrap="square" lIns="91425" tIns="91425" rIns="91425" bIns="91425" anchor="t" anchorCtr="0">
+            <a:noAutofit/>
+          </a:bodyPr>
+          <a:lstStyle>
+            <a:defPPr marR="0" lvl="0" algn="l" rtl="0">
+              <a:lnSpc>
+                <a:spcPct val="100000"/>
+              </a:lnSpc>
+              <a:spcBef>
+                <a:spcPts val="0"/>
+              </a:spcBef>
+              <a:spcAft>
+                <a:spcPts val="0"/>
+              </a:spcAft>
+            </a:defPPr>
+            <a:lvl1pPr marL="457200" marR="0" lvl="0" indent="-304800" algn="l" rtl="0">
+              <a:lnSpc>
+                <a:spcPct val="100000"/>
+              </a:lnSpc>
+              <a:spcBef>
+                <a:spcPts val="0"/>
+              </a:spcBef>
+              <a:spcAft>
+                <a:spcPts val="0"/>
+              </a:spcAft>
+              <a:buClr>
+                <a:schemeClr val="dk1"/>
+              </a:buClr>
+              <a:buSzPts val="1200"/>
+              <a:buFont typeface="Nunito Light"/>
+              <a:buChar char="●"/>
+              <a:defRPr sz="1200" b="0" i="0" u="none" strike="noStrike" cap="none">
+                <a:solidFill>
+                  <a:schemeClr val="dk1"/>
+                </a:solidFill>
+                <a:latin typeface="Lato"/>
+                <a:ea typeface="Lato"/>
+                <a:cs typeface="Lato"/>
+                <a:sym typeface="Lato"/>
+              </a:defRPr>
+            </a:lvl1pPr>
+            <a:lvl2pPr marL="914400" marR="0" lvl="1" indent="-304800" algn="l" rtl="0">
+              <a:lnSpc>
+                <a:spcPct val="100000"/>
+              </a:lnSpc>
+              <a:spcBef>
+                <a:spcPts val="0"/>
+              </a:spcBef>
+              <a:spcAft>
+                <a:spcPts val="0"/>
+              </a:spcAft>
+              <a:buClr>
+                <a:schemeClr val="dk1"/>
+              </a:buClr>
+              <a:buSzPts val="1200"/>
+              <a:buFont typeface="Nunito Light"/>
+              <a:buChar char="○"/>
+              <a:defRPr sz="1200" b="0" i="0" u="none" strike="noStrike" cap="none">
+                <a:solidFill>
+                  <a:schemeClr val="dk1"/>
+                </a:solidFill>
+                <a:latin typeface="Lato"/>
+                <a:ea typeface="Lato"/>
+                <a:cs typeface="Lato"/>
+                <a:sym typeface="Lato"/>
+              </a:defRPr>
+            </a:lvl2pPr>
+            <a:lvl3pPr marL="1371600" marR="0" lvl="2" indent="-304800" algn="l" rtl="0">
+              <a:lnSpc>
+                <a:spcPct val="100000"/>
+              </a:lnSpc>
+              <a:spcBef>
+                <a:spcPts val="0"/>
+              </a:spcBef>
+              <a:spcAft>
+                <a:spcPts val="0"/>
+              </a:spcAft>
+              <a:buClr>
+                <a:schemeClr val="dk1"/>
+              </a:buClr>
+              <a:buSzPts val="1200"/>
+              <a:buFont typeface="Nunito Light"/>
+              <a:buChar char="■"/>
+              <a:defRPr sz="1200" b="0" i="0" u="none" strike="noStrike" cap="none">
+                <a:solidFill>
+                  <a:schemeClr val="dk1"/>
+                </a:solidFill>
+                <a:latin typeface="Lato"/>
+                <a:ea typeface="Lato"/>
+                <a:cs typeface="Lato"/>
+                <a:sym typeface="Lato"/>
+              </a:defRPr>
+            </a:lvl3pPr>
+            <a:lvl4pPr marL="1828800" marR="0" lvl="3" indent="-304800" algn="l" rtl="0">
+              <a:lnSpc>
+                <a:spcPct val="100000"/>
+              </a:lnSpc>
+              <a:spcBef>
+                <a:spcPts val="0"/>
+              </a:spcBef>
+              <a:spcAft>
+                <a:spcPts val="0"/>
+              </a:spcAft>
+              <a:buClr>
+                <a:schemeClr val="dk1"/>
+              </a:buClr>
+              <a:buSzPts val="1200"/>
+              <a:buFont typeface="Nunito Light"/>
+              <a:buChar char="●"/>
+              <a:defRPr sz="1200" b="0" i="0" u="none" strike="noStrike" cap="none">
+                <a:solidFill>
+                  <a:schemeClr val="dk1"/>
+                </a:solidFill>
+                <a:latin typeface="Lato"/>
+                <a:ea typeface="Lato"/>
+                <a:cs typeface="Lato"/>
+                <a:sym typeface="Lato"/>
+              </a:defRPr>
+            </a:lvl4pPr>
+            <a:lvl5pPr marL="2286000" marR="0" lvl="4" indent="-304800" algn="l" rtl="0">
+              <a:lnSpc>
+                <a:spcPct val="100000"/>
+              </a:lnSpc>
+              <a:spcBef>
+                <a:spcPts val="0"/>
+              </a:spcBef>
+              <a:spcAft>
+                <a:spcPts val="0"/>
+              </a:spcAft>
+              <a:buClr>
+                <a:schemeClr val="dk1"/>
+              </a:buClr>
+              <a:buSzPts val="1200"/>
+              <a:buFont typeface="Nunito Light"/>
+              <a:buChar char="○"/>
+              <a:defRPr sz="1200" b="0" i="0" u="none" strike="noStrike" cap="none">
+                <a:solidFill>
+                  <a:schemeClr val="dk1"/>
+                </a:solidFill>
+                <a:latin typeface="Lato"/>
+                <a:ea typeface="Lato"/>
+                <a:cs typeface="Lato"/>
+                <a:sym typeface="Lato"/>
+              </a:defRPr>
+            </a:lvl5pPr>
+            <a:lvl6pPr marL="2743200" marR="0" lvl="5" indent="-304800" algn="l" rtl="0">
+              <a:lnSpc>
+                <a:spcPct val="100000"/>
+              </a:lnSpc>
+              <a:spcBef>
+                <a:spcPts val="0"/>
+              </a:spcBef>
+              <a:spcAft>
+                <a:spcPts val="0"/>
+              </a:spcAft>
+              <a:buClr>
+                <a:schemeClr val="dk1"/>
+              </a:buClr>
+              <a:buSzPts val="1200"/>
+              <a:buFont typeface="Nunito Light"/>
+              <a:buChar char="■"/>
+              <a:defRPr sz="1200" b="0" i="0" u="none" strike="noStrike" cap="none">
+                <a:solidFill>
+                  <a:schemeClr val="dk1"/>
+                </a:solidFill>
+                <a:latin typeface="Lato"/>
+                <a:ea typeface="Lato"/>
+                <a:cs typeface="Lato"/>
+                <a:sym typeface="Lato"/>
+              </a:defRPr>
+            </a:lvl6pPr>
+            <a:lvl7pPr marL="3200400" marR="0" lvl="6" indent="-304800" algn="l" rtl="0">
+              <a:lnSpc>
+                <a:spcPct val="100000"/>
+              </a:lnSpc>
+              <a:spcBef>
+                <a:spcPts val="0"/>
+              </a:spcBef>
+              <a:spcAft>
+                <a:spcPts val="0"/>
+              </a:spcAft>
+              <a:buClr>
+                <a:schemeClr val="dk1"/>
+              </a:buClr>
+              <a:buSzPts val="1200"/>
+              <a:buFont typeface="Nunito Light"/>
+              <a:buChar char="●"/>
+              <a:defRPr sz="1200" b="0" i="0" u="none" strike="noStrike" cap="none">
+                <a:solidFill>
+                  <a:schemeClr val="dk1"/>
+                </a:solidFill>
+                <a:latin typeface="Lato"/>
+                <a:ea typeface="Lato"/>
+                <a:cs typeface="Lato"/>
+                <a:sym typeface="Lato"/>
+              </a:defRPr>
+            </a:lvl7pPr>
+            <a:lvl8pPr marL="3657600" marR="0" lvl="7" indent="-304800" algn="l" rtl="0">
+              <a:lnSpc>
+                <a:spcPct val="100000"/>
+              </a:lnSpc>
+              <a:spcBef>
+                <a:spcPts val="0"/>
+              </a:spcBef>
+              <a:spcAft>
+                <a:spcPts val="0"/>
+              </a:spcAft>
+              <a:buClr>
+                <a:schemeClr val="dk1"/>
+              </a:buClr>
+              <a:buSzPts val="1200"/>
+              <a:buFont typeface="Nunito Light"/>
+              <a:buChar char="○"/>
+              <a:defRPr sz="1200" b="0" i="0" u="none" strike="noStrike" cap="none">
+                <a:solidFill>
+                  <a:schemeClr val="dk1"/>
+                </a:solidFill>
+                <a:latin typeface="Lato"/>
+                <a:ea typeface="Lato"/>
+                <a:cs typeface="Lato"/>
+                <a:sym typeface="Lato"/>
+              </a:defRPr>
+            </a:lvl8pPr>
+            <a:lvl9pPr marL="4114800" marR="0" lvl="8" indent="-304800" algn="l" rtl="0">
+              <a:lnSpc>
+                <a:spcPct val="100000"/>
+              </a:lnSpc>
+              <a:spcBef>
+                <a:spcPts val="0"/>
+              </a:spcBef>
+              <a:spcAft>
+                <a:spcPts val="0"/>
+              </a:spcAft>
+              <a:buClr>
+                <a:schemeClr val="dk1"/>
+              </a:buClr>
+              <a:buSzPts val="1200"/>
+              <a:buFont typeface="Nunito Light"/>
+              <a:buChar char="■"/>
+              <a:defRPr sz="1200" b="0" i="0" u="none" strike="noStrike" cap="none">
+                <a:solidFill>
+                  <a:schemeClr val="dk1"/>
+                </a:solidFill>
+                <a:latin typeface="Lato"/>
+                <a:ea typeface="Lato"/>
+                <a:cs typeface="Lato"/>
+                <a:sym typeface="Lato"/>
+              </a:defRPr>
+            </a:lvl9pPr>
+          </a:lstStyle>
+          <a:p>
+            <a:pPr marL="152400" indent="0" algn="just">
+              <a:lnSpc>
+                <a:spcPct val="107000"/>
+              </a:lnSpc>
+              <a:spcAft>
+                <a:spcPts val="800"/>
+              </a:spcAft>
+              <a:buNone/>
+            </a:pPr>
+            <a:r>
+              <a:rPr lang="cs-CZ" sz="1400" b="1" dirty="0"/>
+              <a:t>Frontend</a:t>
+            </a:r>
+          </a:p>
+          <a:p>
+            <a:pPr algn="just">
+              <a:lnSpc>
+                <a:spcPct val="107000"/>
+              </a:lnSpc>
+              <a:spcAft>
+                <a:spcPts val="800"/>
+              </a:spcAft>
+            </a:pPr>
+            <a:r>
+              <a:rPr lang="cs-CZ" sz="1400" dirty="0"/>
+              <a:t>MUI (</a:t>
+            </a:r>
+            <a:r>
+              <a:rPr lang="cs-CZ" sz="1400" dirty="0" err="1"/>
+              <a:t>Material</a:t>
+            </a:r>
+            <a:r>
+              <a:rPr lang="cs-CZ" sz="1400" dirty="0"/>
+              <a:t>-UI)</a:t>
+            </a:r>
+          </a:p>
+          <a:p>
+            <a:pPr algn="just">
+              <a:lnSpc>
+                <a:spcPct val="107000"/>
+              </a:lnSpc>
+              <a:spcAft>
+                <a:spcPts val="800"/>
+              </a:spcAft>
+            </a:pPr>
+            <a:r>
+              <a:rPr lang="cs-CZ" sz="1400" dirty="0" err="1"/>
+              <a:t>Emotion</a:t>
+            </a:r>
+            <a:endParaRPr lang="cs-CZ" sz="1400" dirty="0"/>
+          </a:p>
+          <a:p>
+            <a:pPr algn="just">
+              <a:lnSpc>
+                <a:spcPct val="107000"/>
+              </a:lnSpc>
+              <a:spcAft>
+                <a:spcPts val="800"/>
+              </a:spcAft>
+            </a:pPr>
+            <a:r>
+              <a:rPr lang="cs-CZ" sz="1400" dirty="0" err="1"/>
+              <a:t>Axios</a:t>
+            </a:r>
+            <a:endParaRPr lang="cs-CZ" sz="1400" dirty="0"/>
+          </a:p>
+          <a:p>
+            <a:pPr algn="just">
+              <a:lnSpc>
+                <a:spcPct val="107000"/>
+              </a:lnSpc>
+              <a:spcAft>
+                <a:spcPts val="800"/>
+              </a:spcAft>
+            </a:pPr>
+            <a:r>
+              <a:rPr lang="cs-CZ" sz="1400" dirty="0" err="1"/>
+              <a:t>React</a:t>
+            </a:r>
+            <a:r>
+              <a:rPr lang="cs-CZ" sz="1400" dirty="0"/>
+              <a:t> Router Dom</a:t>
+            </a:r>
+          </a:p>
+          <a:p>
+            <a:pPr algn="just">
+              <a:lnSpc>
+                <a:spcPct val="107000"/>
+              </a:lnSpc>
+              <a:spcAft>
+                <a:spcPts val="800"/>
+              </a:spcAft>
+            </a:pPr>
+            <a:r>
+              <a:rPr lang="cs-CZ" sz="1400" dirty="0" err="1"/>
+              <a:t>Date-fns</a:t>
+            </a:r>
+            <a:endParaRPr lang="cs-CZ" sz="1400" dirty="0"/>
+          </a:p>
+          <a:p>
+            <a:pPr algn="just">
+              <a:lnSpc>
+                <a:spcPct val="107000"/>
+              </a:lnSpc>
+              <a:spcAft>
+                <a:spcPts val="800"/>
+              </a:spcAft>
+            </a:pPr>
+            <a:r>
+              <a:rPr lang="cs-CZ" sz="1400" dirty="0"/>
+              <a:t>PayPal (</a:t>
+            </a:r>
+            <a:r>
+              <a:rPr lang="cs-CZ" sz="1400" dirty="0" err="1"/>
+              <a:t>React</a:t>
+            </a:r>
+            <a:r>
+              <a:rPr lang="cs-CZ" sz="1400" dirty="0"/>
+              <a:t>-PayPal-</a:t>
+            </a:r>
+            <a:r>
+              <a:rPr lang="cs-CZ" sz="1400" dirty="0" err="1"/>
+              <a:t>js</a:t>
+            </a:r>
+            <a:endParaRPr lang="cs-CZ" sz="1400" dirty="0"/>
+          </a:p>
+          <a:p>
+            <a:pPr algn="just">
+              <a:lnSpc>
+                <a:spcPct val="107000"/>
+              </a:lnSpc>
+              <a:spcAft>
+                <a:spcPts val="800"/>
+              </a:spcAft>
+            </a:pPr>
+            <a:r>
+              <a:rPr lang="cs-CZ" sz="1400" dirty="0"/>
+              <a:t>Google </a:t>
+            </a:r>
+            <a:r>
+              <a:rPr lang="cs-CZ" sz="1400" dirty="0" err="1"/>
+              <a:t>OAuth</a:t>
+            </a:r>
+            <a:r>
+              <a:rPr lang="cs-CZ" sz="1400" dirty="0"/>
+              <a:t> (</a:t>
+            </a:r>
+            <a:r>
+              <a:rPr lang="cs-CZ" sz="1400" dirty="0" err="1"/>
+              <a:t>React</a:t>
+            </a:r>
+            <a:r>
+              <a:rPr lang="cs-CZ" sz="1400" dirty="0"/>
+              <a:t>-</a:t>
+            </a:r>
+            <a:r>
+              <a:rPr lang="cs-CZ" sz="1400" dirty="0" err="1"/>
+              <a:t>OAuth</a:t>
+            </a:r>
+            <a:r>
+              <a:rPr lang="cs-CZ" sz="1400" dirty="0"/>
+              <a:t>-Google</a:t>
+            </a:r>
+          </a:p>
+          <a:p>
+            <a:pPr algn="just">
+              <a:lnSpc>
+                <a:spcPct val="107000"/>
+              </a:lnSpc>
+              <a:spcAft>
+                <a:spcPts val="800"/>
+              </a:spcAft>
+            </a:pPr>
+            <a:r>
+              <a:rPr lang="cs-CZ" sz="1400" dirty="0" err="1"/>
+              <a:t>React</a:t>
+            </a:r>
+            <a:r>
+              <a:rPr lang="cs-CZ" sz="1400" dirty="0"/>
+              <a:t> </a:t>
+            </a:r>
+            <a:r>
+              <a:rPr lang="cs-CZ" sz="1400" dirty="0" err="1"/>
+              <a:t>Scripts</a:t>
+            </a:r>
+            <a:endParaRPr lang="cs-CZ" sz="1400" dirty="0"/>
+          </a:p>
+          <a:p>
+            <a:pPr algn="just">
+              <a:lnSpc>
+                <a:spcPct val="107000"/>
+              </a:lnSpc>
+              <a:spcAft>
+                <a:spcPts val="800"/>
+              </a:spcAft>
+            </a:pPr>
+            <a:r>
+              <a:rPr lang="cs-CZ" sz="1400" dirty="0" err="1"/>
+              <a:t>ESLint</a:t>
+            </a:r>
+            <a:endParaRPr lang="cs-CZ" sz="1400" dirty="0"/>
+          </a:p>
+        </p:txBody>
+      </p:sp>
+    </p:spTree>
+    <p:extLst>
+      <p:ext uri="{BB962C8B-B14F-4D97-AF65-F5344CB8AC3E}">
+        <p14:creationId xmlns:p14="http://schemas.microsoft.com/office/powerpoint/2010/main" val="4291456476"/>
+      </p:ext>
+    </p:extLst>
+  </p:cSld>
+  <p:clrMapOvr>
+    <a:masterClrMapping/>
+  </p:clrMapOvr>
+</p:sld>
+</file>
+
+<file path=ppt/slides/slide5.xml><?xml version="1.0" encoding="utf-8"?>
+<p:sld xmlns:a="http://schemas.openxmlformats.org/drawingml/2006/main" xmlns:r="http://schemas.openxmlformats.org/officeDocument/2006/relationships" xmlns:p="http://schemas.openxmlformats.org/presentationml/2006/main">
+  <p:cSld>
+    <p:spTree>
+      <p:nvGrpSpPr>
+        <p:cNvPr id="1" name=""/>
+        <p:cNvGrpSpPr/>
+        <p:nvPr/>
+      </p:nvGrpSpPr>
+      <p:grpSpPr>
+        <a:xfrm>
+          <a:off x="0" y="0"/>
+          <a:ext cx="0" cy="0"/>
+          <a:chOff x="0" y="0"/>
+          <a:chExt cx="0" cy="0"/>
+        </a:xfrm>
+      </p:grpSpPr>
+      <p:sp>
+        <p:nvSpPr>
+          <p:cNvPr id="2" name="Nadpis 1">
+            <a:extLst>
+              <a:ext uri="{FF2B5EF4-FFF2-40B4-BE49-F238E27FC236}">
                 <a16:creationId xmlns:a16="http://schemas.microsoft.com/office/drawing/2014/main" id="{EE2452CE-5AD4-CCFC-AFD2-11DE54E494A5}"/>
               </a:ext>
             </a:extLst>
@@ -33141,23 +34080,7 @@
             </a:pPr>
             <a:r>
               <a:rPr lang="cs-CZ" sz="1600" dirty="0"/>
-              <a:t>Platební brána PayPal (</a:t>
-            </a:r>
-            <a:r>
-              <a:rPr lang="cs-CZ" sz="1600" dirty="0" err="1"/>
-              <a:t>Sandbox</a:t>
-            </a:r>
-            <a:r>
-              <a:rPr lang="cs-CZ" sz="1600" dirty="0"/>
-              <a:t> </a:t>
-            </a:r>
-            <a:r>
-              <a:rPr lang="cs-CZ" sz="1600" dirty="0" err="1"/>
-              <a:t>mod</a:t>
-            </a:r>
-            <a:r>
-              <a:rPr lang="cs-CZ" sz="1600" dirty="0"/>
-              <a:t>)</a:t>
+              <a:t>Platební brána PayPal </a:t>
             </a:r>
           </a:p>
         </p:txBody>
@@ -33269,7 +34192,7 @@
 </p:sld>
 </file>
 
-<file path=ppt/slides/slide5.xml><?xml version="1.0" encoding="utf-8"?>
+<file path=ppt/slides/slide6.xml><?xml version="1.0" encoding="utf-8"?>
 <p:sld xmlns:a="http://schemas.openxmlformats.org/drawingml/2006/main" xmlns:r="http://schemas.openxmlformats.org/officeDocument/2006/relationships" xmlns:p="http://schemas.openxmlformats.org/presentationml/2006/main">
   <p:cSld>
     <p:spTree>
@@ -33385,7 +34308,7 @@
 </p:sld>
 </file>
 
-<file path=ppt/slides/slide6.xml><?xml version="1.0" encoding="utf-8"?>
+<file path=ppt/slides/slide7.xml><?xml version="1.0" encoding="utf-8"?>
 <p:sld xmlns:a="http://schemas.openxmlformats.org/drawingml/2006/main" xmlns:r="http://schemas.openxmlformats.org/officeDocument/2006/relationships" xmlns:p="http://schemas.openxmlformats.org/presentationml/2006/main">
   <p:cSld>
     <p:spTree>
@@ -33500,7 +34423,7 @@
           <a:p>
             <a:r>
               <a:rPr lang="cs-CZ" sz="1600" dirty="0"/>
-              <a:t>Platba přes PayPal </a:t>
+              <a:t>Platba přes PayPal</a:t>
             </a:r>
           </a:p>
           <a:p>
@@ -33527,7 +34450,7 @@
         <p:spPr>
           <a:xfrm>
             <a:off x="380449" y="2210686"/>
-            <a:ext cx="2762801" cy="1131600"/>
+            <a:ext cx="2762801" cy="1289752"/>
           </a:xfrm>
         </p:spPr>
         <p:txBody>
@@ -33542,6 +34465,13 @@
               <a:rPr lang="cs-CZ" sz="1600" i="1" dirty="0"/>
               <a:t>(CRUD)</a:t>
             </a:r>
+          </a:p>
+          <a:p>
+            <a:r>
+              <a:rPr lang="cs-CZ" sz="1600" dirty="0"/>
+              <a:t>Správa oprávnění</a:t>
+            </a:r>
+            <a:endParaRPr lang="cs-CZ" sz="1600" i="1" dirty="0"/>
           </a:p>
           <a:p>
             <a:r>
@@ -34208,6 +35138,12 @@
               <a:t>Notifikace</a:t>
             </a:r>
           </a:p>
+          <a:p>
+            <a:r>
+              <a:rPr lang="cs-CZ" sz="1600" dirty="0"/>
+              <a:t>Rozvrh</a:t>
+            </a:r>
+          </a:p>
         </p:txBody>
       </p:sp>
     </p:spTree>
@@ -34223,7 +35159,7 @@
 </p:sld>
 </file>
 
-<file path=ppt/slides/slide7.xml><?xml version="1.0" encoding="utf-8"?>
+<file path=ppt/slides/slide8.xml><?xml version="1.0" encoding="utf-8"?>
 <p:sld xmlns:a="http://schemas.openxmlformats.org/drawingml/2006/main" xmlns:r="http://schemas.openxmlformats.org/officeDocument/2006/relationships" xmlns:p="http://schemas.openxmlformats.org/presentationml/2006/main">
   <p:cSld>
     <p:spTree>
@@ -34459,7 +35395,7 @@
 </p:sld>
 </file>
 
-<file path=ppt/slides/slide8.xml><?xml version="1.0" encoding="utf-8"?>
+<file path=ppt/slides/slide9.xml><?xml version="1.0" encoding="utf-8"?>
 <p:sld xmlns:a="http://schemas.openxmlformats.org/drawingml/2006/main" xmlns:r="http://schemas.openxmlformats.org/officeDocument/2006/relationships" xmlns:p="http://schemas.openxmlformats.org/presentationml/2006/main">
   <p:cSld>
     <p:spTree>
@@ -34638,129 +35574,6 @@
     <p:extLst>
       <p:ext uri="{BB962C8B-B14F-4D97-AF65-F5344CB8AC3E}">
         <p14:creationId xmlns:p14="http://schemas.microsoft.com/office/powerpoint/2010/main" val="432335502"/>
-      </p:ext>
-    </p:extLst>
-  </p:cSld>
-  <p:clrMapOvr>
-    <a:masterClrMapping/>
-  </p:clrMapOvr>
-</p:sld>
-</file>
-
-<file path=ppt/slides/slide9.xml><?xml version="1.0" encoding="utf-8"?>
-<p:sld xmlns:a="http://schemas.openxmlformats.org/drawingml/2006/main" xmlns:r="http://schemas.openxmlformats.org/officeDocument/2006/relationships" xmlns:p="http://schemas.openxmlformats.org/presentationml/2006/main">
-  <p:cSld>
-    <p:spTree>
-      <p:nvGrpSpPr>
-        <p:cNvPr id="1" name=""/>
-        <p:cNvGrpSpPr/>
-        <p:nvPr/>
-      </p:nvGrpSpPr>
-      <p:grpSpPr>
-        <a:xfrm>
-          <a:off x="0" y="0"/>
-          <a:ext cx="0" cy="0"/>
-          <a:chOff x="0" y="0"/>
-          <a:chExt cx="0" cy="0"/>
-        </a:xfrm>
-      </p:grpSpPr>
-      <p:sp>
-        <p:nvSpPr>
-          <p:cNvPr id="2" name="Nadpis 1">
-            <a:extLst>
-              <a:ext uri="{FF2B5EF4-FFF2-40B4-BE49-F238E27FC236}">
-                <a16:creationId xmlns:a16="http://schemas.microsoft.com/office/drawing/2014/main" id="{15E4D1DE-7FF0-27CD-B5A1-F60B5999A251}"/>
-              </a:ext>
-            </a:extLst>
-          </p:cNvPr>
-          <p:cNvSpPr>
-            <a:spLocks noGrp="1"/>
-          </p:cNvSpPr>
-          <p:nvPr>
-            <p:ph type="ctrTitle"/>
-          </p:nvPr>
-        </p:nvSpPr>
-        <p:spPr>
-          <a:xfrm>
-            <a:off x="713225" y="1144500"/>
-            <a:ext cx="5101788" cy="2378700"/>
-          </a:xfrm>
-        </p:spPr>
-        <p:txBody>
-          <a:bodyPr/>
-          <a:lstStyle/>
-          <a:p>
-            <a:r>
-              <a:rPr lang="cs-CZ" dirty="0"/>
-              <a:t>Představení … </a:t>
-            </a:r>
-          </a:p>
-        </p:txBody>
-      </p:sp>
-      <p:sp>
-        <p:nvSpPr>
-          <p:cNvPr id="3" name="Podnadpis 2">
-            <a:extLst>
-              <a:ext uri="{FF2B5EF4-FFF2-40B4-BE49-F238E27FC236}">
-                <a16:creationId xmlns:a16="http://schemas.microsoft.com/office/drawing/2014/main" id="{774284EC-D61D-5A02-14B2-61E87E408680}"/>
-              </a:ext>
-            </a:extLst>
-          </p:cNvPr>
-          <p:cNvSpPr>
-            <a:spLocks noGrp="1"/>
-          </p:cNvSpPr>
-          <p:nvPr>
-            <p:ph type="subTitle" idx="1"/>
-          </p:nvPr>
-        </p:nvSpPr>
-        <p:spPr>
-          <a:xfrm>
-            <a:off x="713224" y="3523200"/>
-            <a:ext cx="5008919" cy="475800"/>
-          </a:xfrm>
-        </p:spPr>
-        <p:txBody>
-          <a:bodyPr/>
-          <a:lstStyle/>
-          <a:p>
-            <a:endParaRPr lang="cs-CZ" dirty="0"/>
-          </a:p>
-        </p:txBody>
-      </p:sp>
-      <p:pic>
-        <p:nvPicPr>
-          <p:cNvPr id="4" name="Obrázek 3" descr="Obsah obrázku černá, tma&#10;&#10;Popis byl vytvořen automaticky">
-            <a:extLst>
-              <a:ext uri="{FF2B5EF4-FFF2-40B4-BE49-F238E27FC236}">
-                <a16:creationId xmlns:a16="http://schemas.microsoft.com/office/drawing/2014/main" id="{503A4904-D0E9-1BDD-DF2C-940EBD17D544}"/>
-              </a:ext>
-            </a:extLst>
-          </p:cNvPr>
-          <p:cNvPicPr>
-            <a:picLocks noChangeAspect="1"/>
-          </p:cNvPicPr>
-          <p:nvPr/>
-        </p:nvPicPr>
-        <p:blipFill>
-          <a:blip r:embed="rId2"/>
-          <a:stretch>
-            <a:fillRect/>
-          </a:stretch>
-        </p:blipFill>
-        <p:spPr>
-          <a:xfrm>
-            <a:off x="6749495" y="3003247"/>
-            <a:ext cx="2321353" cy="2321353"/>
-          </a:xfrm>
-          <a:prstGeom prst="rect">
-            <a:avLst/>
-          </a:prstGeom>
-        </p:spPr>
-      </p:pic>
-    </p:spTree>
-    <p:extLst>
-      <p:ext uri="{BB962C8B-B14F-4D97-AF65-F5344CB8AC3E}">
-        <p14:creationId xmlns:p14="http://schemas.microsoft.com/office/powerpoint/2010/main" val="3263248756"/>
       </p:ext>
     </p:extLst>
   </p:cSld>

</xml_diff>